<commit_message>
Rename Disease entity to DengueCase
</commit_message>
<xml_diff>
--- a/docs/logical-dim-schema.pptx
+++ b/docs/logical-dim-schema.pptx
@@ -3012,7 +3012,7 @@
             <a:p>
               <a:r>
                 <a:rPr lang="en-SG" sz="1200" dirty="0" err="1" smtClean="0"/>
-                <a:t>factDisease</a:t>
+                <a:t>factDengueCase</a:t>
               </a:r>
               <a:endParaRPr lang="en-SG" sz="1200" dirty="0" smtClean="0"/>
             </a:p>
@@ -3030,14 +3030,12 @@
                 <a:rPr lang="en-SG" sz="1200" dirty="0" smtClean="0"/>
                 <a:t>Latitude (PK)</a:t>
               </a:r>
-              <a:endParaRPr lang="en-SG" sz="1200" dirty="0" smtClean="0"/>
             </a:p>
             <a:p>
               <a:r>
                 <a:rPr lang="en-SG" sz="1200" dirty="0" smtClean="0"/>
                 <a:t>Longitude (PK)</a:t>
               </a:r>
-              <a:endParaRPr lang="en-SG" sz="1200" dirty="0" smtClean="0"/>
             </a:p>
             <a:p>
               <a:r>
@@ -3059,11 +3057,7 @@
               </a:r>
               <a:r>
                 <a:rPr lang="en-SG" sz="1200" dirty="0" smtClean="0"/>
-                <a:t> </a:t>
-              </a:r>
-              <a:r>
-                <a:rPr lang="en-SG" sz="1200" dirty="0" smtClean="0"/>
-                <a:t>(FK)</a:t>
+                <a:t> (FK)</a:t>
               </a:r>
             </a:p>
           </p:txBody>
@@ -3147,11 +3141,7 @@
             <a:p>
               <a:r>
                 <a:rPr lang="en-SG" sz="1200" dirty="0" err="1" smtClean="0"/>
-                <a:t>fact</a:t>
-              </a:r>
-              <a:r>
-                <a:rPr lang="en-SG" sz="1200" dirty="0" err="1" smtClean="0"/>
-                <a:t>Weather</a:t>
+                <a:t>factWeather</a:t>
               </a:r>
               <a:endParaRPr lang="en-SG" sz="1200" dirty="0" smtClean="0"/>
             </a:p>
@@ -3163,7 +3153,6 @@
                 <a:rPr lang="en-SG" sz="1200" dirty="0" smtClean="0"/>
                 <a:t>Date (PK) (FK)</a:t>
               </a:r>
-              <a:endParaRPr lang="en-SG" sz="1200" dirty="0" smtClean="0"/>
             </a:p>
             <a:p>
               <a:r>
@@ -3174,7 +3163,6 @@
                 <a:rPr lang="en-SG" sz="1200" dirty="0" smtClean="0"/>
                 <a:t> (PK) (FK)</a:t>
               </a:r>
-              <a:endParaRPr lang="en-SG" sz="1200" dirty="0" smtClean="0"/>
             </a:p>
             <a:p>
               <a:r>
@@ -3242,11 +3230,7 @@
             <a:p>
               <a:r>
                 <a:rPr lang="en-SG" sz="1200" dirty="0" err="1" smtClean="0"/>
-                <a:t>Mean</a:t>
-              </a:r>
-              <a:r>
-                <a:rPr lang="en-SG" sz="1200" dirty="0" err="1" smtClean="0"/>
-                <a:t>Humidity</a:t>
+                <a:t>MeanHumidity</a:t>
               </a:r>
               <a:endParaRPr lang="en-SG" sz="1200" dirty="0" smtClean="0"/>
             </a:p>
@@ -3388,7 +3372,6 @@
                 <a:rPr lang="en-SG" sz="1200" dirty="0" smtClean="0"/>
                 <a:t> (PK)</a:t>
               </a:r>
-              <a:endParaRPr lang="en-SG" sz="1200" dirty="0" smtClean="0"/>
             </a:p>
             <a:p>
               <a:r>
@@ -3402,7 +3385,6 @@
                 <a:rPr lang="en-SG" sz="1200" dirty="0" smtClean="0"/>
                 <a:t>Description</a:t>
               </a:r>
-              <a:endParaRPr lang="en-SG" sz="1200" dirty="0" smtClean="0"/>
             </a:p>
           </p:txBody>
         </p:sp>
@@ -3507,7 +3489,6 @@
                 <a:rPr lang="en-SG" sz="1200" dirty="0" smtClean="0"/>
                 <a:t>Address</a:t>
               </a:r>
-              <a:endParaRPr lang="en-SG" sz="1200" dirty="0" smtClean="0"/>
             </a:p>
             <a:p>
               <a:r>
@@ -3530,7 +3511,6 @@
                 <a:rPr lang="en-SG" sz="1200" dirty="0" smtClean="0"/>
                 <a:t> (FK)</a:t>
               </a:r>
-              <a:endParaRPr lang="en-SG" sz="1200" dirty="0" smtClean="0"/>
             </a:p>
           </p:txBody>
         </p:sp>
@@ -3946,11 +3926,7 @@
             <a:p>
               <a:r>
                 <a:rPr lang="en-SG" sz="1200" dirty="0" err="1" smtClean="0"/>
-                <a:t>WeekNum</a:t>
-              </a:r>
-              <a:r>
-                <a:rPr lang="en-SG" sz="1200" dirty="0" err="1" smtClean="0"/>
-                <a:t>ber</a:t>
+                <a:t>WeekNumber</a:t>
               </a:r>
               <a:endParaRPr lang="en-SG" sz="1200" dirty="0" smtClean="0"/>
             </a:p>
@@ -3959,14 +3935,12 @@
                 <a:rPr lang="en-SG" sz="1200" dirty="0" smtClean="0"/>
                 <a:t>Month</a:t>
               </a:r>
-              <a:endParaRPr lang="en-SG" sz="1200" dirty="0" smtClean="0"/>
             </a:p>
             <a:p>
               <a:r>
                 <a:rPr lang="en-SG" sz="1200" dirty="0" smtClean="0"/>
                 <a:t>Year</a:t>
               </a:r>
-              <a:endParaRPr lang="en-SG" sz="1200" dirty="0" smtClean="0"/>
             </a:p>
           </p:txBody>
         </p:sp>

</xml_diff>

<commit_message>
Updated logical schema with PSI entity corrected
</commit_message>
<xml_diff>
--- a/docs/logical-dim-schema.pptx
+++ b/docs/logical-dim-schema.pptx
@@ -3069,7 +3069,7 @@
           </p:nvCxnSpPr>
           <p:spPr>
             <a:xfrm flipH="1">
-              <a:off x="4296229" y="1175657"/>
+              <a:off x="4296229" y="1126013"/>
               <a:ext cx="1200970" cy="1"/>
             </a:xfrm>
             <a:prstGeom prst="line">
@@ -3105,10 +3105,10 @@
         </p:nvGrpSpPr>
         <p:grpSpPr>
           <a:xfrm>
-            <a:off x="6776040" y="514373"/>
-            <a:ext cx="1844545" cy="3046988"/>
-            <a:chOff x="4296229" y="798286"/>
-            <a:chExt cx="1172394" cy="3046988"/>
+            <a:off x="6773951" y="514373"/>
+            <a:ext cx="1846633" cy="3046988"/>
+            <a:chOff x="4294901" y="798286"/>
+            <a:chExt cx="1173721" cy="3046988"/>
           </a:xfrm>
         </p:grpSpPr>
         <p:sp>
@@ -3257,7 +3257,7 @@
           </p:nvCxnSpPr>
           <p:spPr>
             <a:xfrm flipH="1" flipV="1">
-              <a:off x="4296231" y="1175659"/>
+              <a:off x="4294901" y="1127340"/>
               <a:ext cx="1172392" cy="6343"/>
             </a:xfrm>
             <a:prstGeom prst="line">
@@ -3494,7 +3494,7 @@
           </p:nvCxnSpPr>
           <p:spPr>
             <a:xfrm flipH="1" flipV="1">
-              <a:off x="4296229" y="1175657"/>
+              <a:off x="4296229" y="1112477"/>
               <a:ext cx="1514132" cy="3629"/>
             </a:xfrm>
             <a:prstGeom prst="line">
@@ -3888,7 +3888,7 @@
           </p:nvCxnSpPr>
           <p:spPr>
             <a:xfrm flipH="1">
-              <a:off x="4296229" y="1110852"/>
+              <a:off x="4296229" y="1052281"/>
               <a:ext cx="1200970" cy="1"/>
             </a:xfrm>
             <a:prstGeom prst="line">
@@ -4279,9 +4279,9 @@
         </p:nvGrpSpPr>
         <p:grpSpPr>
           <a:xfrm>
-            <a:off x="4870521" y="1311121"/>
+            <a:off x="4870520" y="1311121"/>
             <a:ext cx="1200970" cy="1384995"/>
-            <a:chOff x="4296229" y="798286"/>
+            <a:chOff x="4296228" y="798286"/>
             <a:chExt cx="1200970" cy="1384995"/>
           </a:xfrm>
         </p:grpSpPr>
@@ -4332,7 +4332,6 @@
                 <a:rPr lang="en-SG" sz="1200" dirty="0" smtClean="0"/>
                 <a:t>MeanUVIndex</a:t>
               </a:r>
-              <a:endParaRPr lang="en-SG" sz="1200" dirty="0" smtClean="0"/>
             </a:p>
             <a:p>
               <a:r>
@@ -4368,7 +4367,7 @@
           </p:nvCxnSpPr>
           <p:spPr>
             <a:xfrm flipH="1">
-              <a:off x="4296229" y="1175657"/>
+              <a:off x="4296228" y="1129034"/>
               <a:ext cx="1200970" cy="1"/>
             </a:xfrm>
             <a:prstGeom prst="line">
@@ -4575,9 +4574,9 @@
         <p:grpSpPr>
           <a:xfrm>
             <a:off x="4876197" y="2991154"/>
-            <a:ext cx="1200970" cy="1015663"/>
+            <a:ext cx="1200970" cy="1384995"/>
             <a:chOff x="4296229" y="798286"/>
-            <a:chExt cx="1200970" cy="1015663"/>
+            <a:chExt cx="1200970" cy="1384995"/>
           </a:xfrm>
         </p:grpSpPr>
         <p:sp>
@@ -4589,7 +4588,7 @@
           <p:spPr>
             <a:xfrm>
               <a:off x="4296229" y="798286"/>
-              <a:ext cx="1200968" cy="1015663"/>
+              <a:ext cx="1200968" cy="1384995"/>
             </a:xfrm>
             <a:prstGeom prst="rect">
               <a:avLst/>
@@ -4624,8 +4623,22 @@
             </a:p>
             <a:p>
               <a:r>
-                <a:rPr lang="en-SG" sz="1200" dirty="0" smtClean="0"/>
-                <a:t>PSI</a:t>
+                <a:rPr lang="en-SG" sz="1200" dirty="0" err="1" smtClean="0"/>
+                <a:t>MeanPSI</a:t>
+              </a:r>
+              <a:endParaRPr lang="en-SG" sz="1200" dirty="0"/>
+            </a:p>
+            <a:p>
+              <a:r>
+                <a:rPr lang="en-SG" sz="1200" dirty="0" err="1" smtClean="0"/>
+                <a:t>MaxPSI</a:t>
+              </a:r>
+              <a:endParaRPr lang="en-SG" sz="1200" dirty="0"/>
+            </a:p>
+            <a:p>
+              <a:r>
+                <a:rPr lang="en-SG" sz="1200" dirty="0" err="1" smtClean="0"/>
+                <a:t>MinPSI</a:t>
               </a:r>
               <a:endParaRPr lang="en-SG" sz="1200" dirty="0"/>
             </a:p>
@@ -4649,7 +4662,7 @@
           </p:nvCxnSpPr>
           <p:spPr>
             <a:xfrm flipH="1">
-              <a:off x="4296229" y="1175657"/>
+              <a:off x="4296229" y="1126467"/>
               <a:ext cx="1200970" cy="1"/>
             </a:xfrm>
             <a:prstGeom prst="line">
@@ -4770,7 +4783,7 @@
         </p:nvGrpSpPr>
         <p:grpSpPr>
           <a:xfrm flipH="1">
-            <a:off x="6079254" y="3391390"/>
+            <a:off x="6070840" y="3568644"/>
             <a:ext cx="124322" cy="235296"/>
             <a:chOff x="3360772" y="2469497"/>
             <a:chExt cx="126411" cy="229510"/>
@@ -4890,8 +4903,8 @@
         </p:nvCxnSpPr>
         <p:spPr>
           <a:xfrm flipH="1">
-            <a:off x="3988869" y="1485634"/>
-            <a:ext cx="412670" cy="2"/>
+            <a:off x="3988915" y="1500762"/>
+            <a:ext cx="313341" cy="2"/>
           </a:xfrm>
           <a:prstGeom prst="line">
             <a:avLst/>
@@ -4925,7 +4938,7 @@
         </p:nvCxnSpPr>
         <p:spPr>
           <a:xfrm>
-            <a:off x="4052965" y="1394157"/>
+            <a:off x="4052965" y="1409283"/>
             <a:ext cx="0" cy="182957"/>
           </a:xfrm>
           <a:prstGeom prst="line">
@@ -5040,18 +5053,18 @@
       <p:cxnSp>
         <p:nvCxnSpPr>
           <p:cNvPr id="95" name="Elbow Connector 94"/>
-          <p:cNvCxnSpPr>
-            <a:endCxn id="67" idx="1"/>
-          </p:cNvCxnSpPr>
+          <p:cNvCxnSpPr/>
           <p:nvPr/>
         </p:nvCxnSpPr>
         <p:spPr>
           <a:xfrm rot="16200000" flipH="1">
-            <a:off x="3632193" y="2254981"/>
-            <a:ext cx="2013351" cy="474658"/>
-          </a:xfrm>
-          <a:prstGeom prst="bentConnector2">
-            <a:avLst/>
+            <a:off x="3561768" y="2246929"/>
+            <a:ext cx="2060597" cy="568264"/>
+          </a:xfrm>
+          <a:prstGeom prst="bentConnector3">
+            <a:avLst>
+              <a:gd name="adj1" fmla="val 97704"/>
+            </a:avLst>
           </a:prstGeom>
           <a:ln>
             <a:solidFill>
@@ -5221,21 +5234,18 @@
       </p:cxnSp>
       <p:cxnSp>
         <p:nvCxnSpPr>
-          <p:cNvPr id="115" name="Elbow Connector 114"/>
-          <p:cNvCxnSpPr>
-            <a:stCxn id="67" idx="3"/>
-          </p:cNvCxnSpPr>
+          <p:cNvPr id="121" name="Elbow Connector 120"/>
+          <p:cNvCxnSpPr/>
           <p:nvPr/>
         </p:nvCxnSpPr>
         <p:spPr>
-          <a:xfrm flipH="1">
-            <a:off x="6063850" y="3498986"/>
-            <a:ext cx="13315" cy="1196344"/>
-          </a:xfrm>
-          <a:prstGeom prst="bentConnector4">
+          <a:xfrm>
+            <a:off x="3994770" y="1214906"/>
+            <a:ext cx="881429" cy="889081"/>
+          </a:xfrm>
+          <a:prstGeom prst="bentConnector3">
             <a:avLst>
-              <a:gd name="adj1" fmla="val -2861434"/>
-              <a:gd name="adj2" fmla="val 99249"/>
+              <a:gd name="adj1" fmla="val 55187"/>
             </a:avLst>
           </a:prstGeom>
           <a:ln>
@@ -5261,18 +5271,21 @@
       </p:cxnSp>
       <p:cxnSp>
         <p:nvCxnSpPr>
-          <p:cNvPr id="121" name="Elbow Connector 120"/>
-          <p:cNvCxnSpPr/>
+          <p:cNvPr id="96" name="Elbow Connector 95"/>
+          <p:cNvCxnSpPr>
+            <a:stCxn id="67" idx="3"/>
+          </p:cNvCxnSpPr>
           <p:nvPr/>
         </p:nvCxnSpPr>
         <p:spPr>
-          <a:xfrm>
-            <a:off x="3994770" y="1214906"/>
-            <a:ext cx="881429" cy="889081"/>
-          </a:xfrm>
-          <a:prstGeom prst="bentConnector3">
+          <a:xfrm flipH="1">
+            <a:off x="6075057" y="3683652"/>
+            <a:ext cx="2108" cy="1004088"/>
+          </a:xfrm>
+          <a:prstGeom prst="bentConnector4">
             <a:avLst>
-              <a:gd name="adj1" fmla="val 55187"/>
+              <a:gd name="adj1" fmla="val -15724383"/>
+              <a:gd name="adj2" fmla="val 99928"/>
             </a:avLst>
           </a:prstGeom>
           <a:ln>

</xml_diff>

<commit_message>
Added HDBLocation; removed PSI max & min
Also added surrogate keys for some tables, in line with LeiJun's diagram.
</commit_message>
<xml_diff>
--- a/docs/logical-dim-schema.pptx
+++ b/docs/logical-dim-schema.pptx
@@ -243,7 +243,7 @@
           <a:p>
             <a:fld id="{396868D5-0678-458C-B9C5-99CC38360805}" type="datetimeFigureOut">
               <a:rPr lang="en-SG" smtClean="0"/>
-              <a:t>27/9/2016</a:t>
+              <a:t>28/9/2016</a:t>
             </a:fld>
             <a:endParaRPr lang="en-SG"/>
           </a:p>
@@ -413,7 +413,7 @@
           <a:p>
             <a:fld id="{396868D5-0678-458C-B9C5-99CC38360805}" type="datetimeFigureOut">
               <a:rPr lang="en-SG" smtClean="0"/>
-              <a:t>27/9/2016</a:t>
+              <a:t>28/9/2016</a:t>
             </a:fld>
             <a:endParaRPr lang="en-SG"/>
           </a:p>
@@ -593,7 +593,7 @@
           <a:p>
             <a:fld id="{396868D5-0678-458C-B9C5-99CC38360805}" type="datetimeFigureOut">
               <a:rPr lang="en-SG" smtClean="0"/>
-              <a:t>27/9/2016</a:t>
+              <a:t>28/9/2016</a:t>
             </a:fld>
             <a:endParaRPr lang="en-SG"/>
           </a:p>
@@ -763,7 +763,7 @@
           <a:p>
             <a:fld id="{396868D5-0678-458C-B9C5-99CC38360805}" type="datetimeFigureOut">
               <a:rPr lang="en-SG" smtClean="0"/>
-              <a:t>27/9/2016</a:t>
+              <a:t>28/9/2016</a:t>
             </a:fld>
             <a:endParaRPr lang="en-SG"/>
           </a:p>
@@ -1009,7 +1009,7 @@
           <a:p>
             <a:fld id="{396868D5-0678-458C-B9C5-99CC38360805}" type="datetimeFigureOut">
               <a:rPr lang="en-SG" smtClean="0"/>
-              <a:t>27/9/2016</a:t>
+              <a:t>28/9/2016</a:t>
             </a:fld>
             <a:endParaRPr lang="en-SG"/>
           </a:p>
@@ -1241,7 +1241,7 @@
           <a:p>
             <a:fld id="{396868D5-0678-458C-B9C5-99CC38360805}" type="datetimeFigureOut">
               <a:rPr lang="en-SG" smtClean="0"/>
-              <a:t>27/9/2016</a:t>
+              <a:t>28/9/2016</a:t>
             </a:fld>
             <a:endParaRPr lang="en-SG"/>
           </a:p>
@@ -1608,7 +1608,7 @@
           <a:p>
             <a:fld id="{396868D5-0678-458C-B9C5-99CC38360805}" type="datetimeFigureOut">
               <a:rPr lang="en-SG" smtClean="0"/>
-              <a:t>27/9/2016</a:t>
+              <a:t>28/9/2016</a:t>
             </a:fld>
             <a:endParaRPr lang="en-SG"/>
           </a:p>
@@ -1726,7 +1726,7 @@
           <a:p>
             <a:fld id="{396868D5-0678-458C-B9C5-99CC38360805}" type="datetimeFigureOut">
               <a:rPr lang="en-SG" smtClean="0"/>
-              <a:t>27/9/2016</a:t>
+              <a:t>28/9/2016</a:t>
             </a:fld>
             <a:endParaRPr lang="en-SG"/>
           </a:p>
@@ -1821,7 +1821,7 @@
           <a:p>
             <a:fld id="{396868D5-0678-458C-B9C5-99CC38360805}" type="datetimeFigureOut">
               <a:rPr lang="en-SG" smtClean="0"/>
-              <a:t>27/9/2016</a:t>
+              <a:t>28/9/2016</a:t>
             </a:fld>
             <a:endParaRPr lang="en-SG"/>
           </a:p>
@@ -2098,7 +2098,7 @@
           <a:p>
             <a:fld id="{396868D5-0678-458C-B9C5-99CC38360805}" type="datetimeFigureOut">
               <a:rPr lang="en-SG" smtClean="0"/>
-              <a:t>27/9/2016</a:t>
+              <a:t>28/9/2016</a:t>
             </a:fld>
             <a:endParaRPr lang="en-SG"/>
           </a:p>
@@ -2351,7 +2351,7 @@
           <a:p>
             <a:fld id="{396868D5-0678-458C-B9C5-99CC38360805}" type="datetimeFigureOut">
               <a:rPr lang="en-SG" smtClean="0"/>
-              <a:t>27/9/2016</a:t>
+              <a:t>28/9/2016</a:t>
             </a:fld>
             <a:endParaRPr lang="en-SG"/>
           </a:p>
@@ -2564,7 +2564,7 @@
           <a:p>
             <a:fld id="{396868D5-0678-458C-B9C5-99CC38360805}" type="datetimeFigureOut">
               <a:rPr lang="en-SG" smtClean="0"/>
-              <a:t>27/9/2016</a:t>
+              <a:t>28/9/2016</a:t>
             </a:fld>
             <a:endParaRPr lang="en-SG"/>
           </a:p>
@@ -2977,10 +2977,10 @@
         </p:nvGrpSpPr>
         <p:grpSpPr>
           <a:xfrm>
-            <a:off x="2557630" y="2074728"/>
-            <a:ext cx="1200970" cy="1569660"/>
-            <a:chOff x="4296229" y="798286"/>
-            <a:chExt cx="1200970" cy="1569660"/>
+            <a:off x="2775422" y="1856103"/>
+            <a:ext cx="1209276" cy="1754326"/>
+            <a:chOff x="4486196" y="694474"/>
+            <a:chExt cx="1209276" cy="1754326"/>
           </a:xfrm>
         </p:grpSpPr>
         <p:sp>
@@ -2991,8 +2991,8 @@
           </p:nvSpPr>
           <p:spPr>
             <a:xfrm>
-              <a:off x="4296229" y="798286"/>
-              <a:ext cx="1200970" cy="1569660"/>
+              <a:off x="4494502" y="694474"/>
+              <a:ext cx="1200970" cy="1754326"/>
             </a:xfrm>
             <a:prstGeom prst="rect">
               <a:avLst/>
@@ -3022,19 +3022,25 @@
             <a:p>
               <a:r>
                 <a:rPr lang="en-SG" sz="1200" dirty="0" smtClean="0"/>
-                <a:t>Date (PK) (FK)</a:t>
+                <a:t>ID (PK)</a:t>
               </a:r>
             </a:p>
             <a:p>
               <a:r>
                 <a:rPr lang="en-SG" sz="1200" dirty="0" smtClean="0"/>
-                <a:t>Latitude (PK)</a:t>
+                <a:t>Date (FK)</a:t>
               </a:r>
             </a:p>
             <a:p>
               <a:r>
                 <a:rPr lang="en-SG" sz="1200" dirty="0" smtClean="0"/>
-                <a:t>Longitude (PK)</a:t>
+                <a:t>Latitude</a:t>
+              </a:r>
+            </a:p>
+            <a:p>
+              <a:r>
+                <a:rPr lang="en-SG" sz="1200" dirty="0" smtClean="0"/>
+                <a:t>Longitude</a:t>
               </a:r>
             </a:p>
             <a:p>
@@ -3069,7 +3075,7 @@
           </p:nvCxnSpPr>
           <p:spPr>
             <a:xfrm flipH="1">
-              <a:off x="4296229" y="1126013"/>
+              <a:off x="4486196" y="1003881"/>
               <a:ext cx="1200970" cy="1"/>
             </a:xfrm>
             <a:prstGeom prst="line">
@@ -3106,9 +3112,9 @@
         <p:grpSpPr>
           <a:xfrm>
             <a:off x="6773951" y="514373"/>
-            <a:ext cx="1846633" cy="3046988"/>
+            <a:ext cx="1846633" cy="3231654"/>
             <a:chOff x="4294901" y="798286"/>
-            <a:chExt cx="1173721" cy="3046988"/>
+            <a:chExt cx="1173721" cy="3231654"/>
           </a:xfrm>
         </p:grpSpPr>
         <p:sp>
@@ -3120,7 +3126,7 @@
           <p:spPr>
             <a:xfrm>
               <a:off x="4296229" y="798286"/>
-              <a:ext cx="1172393" cy="3046988"/>
+              <a:ext cx="1172393" cy="3231654"/>
             </a:xfrm>
             <a:prstGeom prst="rect">
               <a:avLst/>
@@ -3150,7 +3156,13 @@
             <a:p>
               <a:r>
                 <a:rPr lang="en-SG" sz="1200" dirty="0" smtClean="0"/>
-                <a:t>Date (PK) (FK)</a:t>
+                <a:t>ID (PK)</a:t>
+              </a:r>
+            </a:p>
+            <a:p>
+              <a:r>
+                <a:rPr lang="en-SG" sz="1200" dirty="0" smtClean="0"/>
+                <a:t>Date (FK)</a:t>
               </a:r>
             </a:p>
             <a:p>
@@ -3160,7 +3172,7 @@
               </a:r>
               <a:r>
                 <a:rPr lang="en-SG" sz="1200" dirty="0" smtClean="0"/>
-                <a:t> (PK) (FK)</a:t>
+                <a:t> (FK)</a:t>
               </a:r>
             </a:p>
             <a:p>
@@ -3293,8 +3305,8 @@
         </p:nvGrpSpPr>
         <p:grpSpPr>
           <a:xfrm>
-            <a:off x="4557357" y="4557947"/>
-            <a:ext cx="1514132" cy="1015663"/>
+            <a:off x="4876197" y="4557947"/>
+            <a:ext cx="1195292" cy="1015663"/>
             <a:chOff x="4346799" y="4077063"/>
             <a:chExt cx="1514132" cy="1015663"/>
           </a:xfrm>
@@ -3530,172 +3542,11 @@
         </p:nvCxnSpPr>
         <p:spPr>
           <a:xfrm>
-            <a:off x="4492116" y="4974299"/>
+            <a:off x="4793679" y="4854083"/>
             <a:ext cx="0" cy="182957"/>
           </a:xfrm>
           <a:prstGeom prst="line">
             <a:avLst/>
-          </a:prstGeom>
-          <a:ln>
-            <a:solidFill>
-              <a:schemeClr val="tx1"/>
-            </a:solidFill>
-          </a:ln>
-        </p:spPr>
-        <p:style>
-          <a:lnRef idx="1">
-            <a:schemeClr val="accent1"/>
-          </a:lnRef>
-          <a:fillRef idx="0">
-            <a:schemeClr val="accent1"/>
-          </a:fillRef>
-          <a:effectRef idx="0">
-            <a:schemeClr val="accent1"/>
-          </a:effectRef>
-          <a:fontRef idx="minor">
-            <a:schemeClr val="tx1"/>
-          </a:fontRef>
-        </p:style>
-      </p:cxnSp>
-      <p:grpSp>
-        <p:nvGrpSpPr>
-          <p:cNvPr id="32" name="Group 31"/>
-          <p:cNvGrpSpPr/>
-          <p:nvPr/>
-        </p:nvGrpSpPr>
-        <p:grpSpPr>
-          <a:xfrm>
-            <a:off x="2431219" y="3269475"/>
-            <a:ext cx="126411" cy="229510"/>
-            <a:chOff x="3360772" y="2469497"/>
-            <a:chExt cx="126411" cy="229510"/>
-          </a:xfrm>
-        </p:grpSpPr>
-        <p:cxnSp>
-          <p:nvCxnSpPr>
-            <p:cNvPr id="36" name="Straight Connector 35"/>
-            <p:cNvCxnSpPr/>
-            <p:nvPr/>
-          </p:nvCxnSpPr>
-          <p:spPr>
-            <a:xfrm flipV="1">
-              <a:off x="3360772" y="2469497"/>
-              <a:ext cx="126411" cy="102677"/>
-            </a:xfrm>
-            <a:prstGeom prst="line">
-              <a:avLst/>
-            </a:prstGeom>
-            <a:ln>
-              <a:solidFill>
-                <a:schemeClr val="tx1"/>
-              </a:solidFill>
-            </a:ln>
-          </p:spPr>
-          <p:style>
-            <a:lnRef idx="1">
-              <a:schemeClr val="accent1"/>
-            </a:lnRef>
-            <a:fillRef idx="0">
-              <a:schemeClr val="accent1"/>
-            </a:fillRef>
-            <a:effectRef idx="0">
-              <a:schemeClr val="accent1"/>
-            </a:effectRef>
-            <a:fontRef idx="minor">
-              <a:schemeClr val="tx1"/>
-            </a:fontRef>
-          </p:style>
-        </p:cxnSp>
-        <p:cxnSp>
-          <p:nvCxnSpPr>
-            <p:cNvPr id="38" name="Straight Connector 37"/>
-            <p:cNvCxnSpPr/>
-            <p:nvPr/>
-          </p:nvCxnSpPr>
-          <p:spPr>
-            <a:xfrm>
-              <a:off x="3360772" y="2572174"/>
-              <a:ext cx="126411" cy="126833"/>
-            </a:xfrm>
-            <a:prstGeom prst="line">
-              <a:avLst/>
-            </a:prstGeom>
-            <a:ln>
-              <a:solidFill>
-                <a:schemeClr val="tx1"/>
-              </a:solidFill>
-            </a:ln>
-          </p:spPr>
-          <p:style>
-            <a:lnRef idx="1">
-              <a:schemeClr val="accent1"/>
-            </a:lnRef>
-            <a:fillRef idx="0">
-              <a:schemeClr val="accent1"/>
-            </a:fillRef>
-            <a:effectRef idx="0">
-              <a:schemeClr val="accent1"/>
-            </a:effectRef>
-            <a:fontRef idx="minor">
-              <a:schemeClr val="tx1"/>
-            </a:fontRef>
-          </p:style>
-        </p:cxnSp>
-      </p:grpSp>
-      <p:cxnSp>
-        <p:nvCxnSpPr>
-          <p:cNvPr id="43" name="Elbow Connector 42"/>
-          <p:cNvCxnSpPr>
-            <a:endCxn id="18" idx="1"/>
-          </p:cNvCxnSpPr>
-          <p:nvPr/>
-        </p:nvCxnSpPr>
-        <p:spPr>
-          <a:xfrm>
-            <a:off x="2565207" y="3362547"/>
-            <a:ext cx="1992150" cy="1703232"/>
-          </a:xfrm>
-          <a:prstGeom prst="bentConnector3">
-            <a:avLst>
-              <a:gd name="adj1" fmla="val -13554"/>
-            </a:avLst>
-          </a:prstGeom>
-          <a:ln>
-            <a:solidFill>
-              <a:schemeClr val="tx1"/>
-            </a:solidFill>
-          </a:ln>
-        </p:spPr>
-        <p:style>
-          <a:lnRef idx="1">
-            <a:schemeClr val="accent1"/>
-          </a:lnRef>
-          <a:fillRef idx="0">
-            <a:schemeClr val="accent1"/>
-          </a:fillRef>
-          <a:effectRef idx="0">
-            <a:schemeClr val="accent1"/>
-          </a:effectRef>
-          <a:fontRef idx="minor">
-            <a:schemeClr val="tx1"/>
-          </a:fontRef>
-        </p:style>
-      </p:cxnSp>
-      <p:cxnSp>
-        <p:nvCxnSpPr>
-          <p:cNvPr id="52" name="Elbow Connector 51"/>
-          <p:cNvCxnSpPr/>
-          <p:nvPr/>
-        </p:nvCxnSpPr>
-        <p:spPr>
-          <a:xfrm>
-            <a:off x="6071489" y="5065778"/>
-            <a:ext cx="1034328" cy="352569"/>
-          </a:xfrm>
-          <a:prstGeom prst="bentConnector3">
-            <a:avLst>
-              <a:gd name="adj1" fmla="val 50000"/>
-            </a:avLst>
           </a:prstGeom>
           <a:ln>
             <a:solidFill>
@@ -3726,7 +3577,7 @@
         </p:nvGrpSpPr>
         <p:grpSpPr>
           <a:xfrm>
-            <a:off x="6979406" y="5320716"/>
+            <a:off x="6985743" y="4964645"/>
             <a:ext cx="126411" cy="229510"/>
             <a:chOff x="3360772" y="2469497"/>
             <a:chExt cx="126411" cy="229510"/>
@@ -4045,15 +3896,12 @@
           <p:nvPr/>
         </p:nvCxnSpPr>
         <p:spPr>
-          <a:xfrm rot="5400000">
-            <a:off x="1775216" y="1846651"/>
-            <a:ext cx="1795321" cy="230492"/>
-          </a:xfrm>
-          <a:prstGeom prst="bentConnector4">
-            <a:avLst>
-              <a:gd name="adj1" fmla="val 157"/>
-              <a:gd name="adj2" fmla="val 199179"/>
-            </a:avLst>
+          <a:xfrm rot="16200000" flipH="1">
+            <a:off x="1789255" y="1738792"/>
+            <a:ext cx="1483815" cy="505131"/>
+          </a:xfrm>
+          <a:prstGeom prst="bentConnector2">
+            <a:avLst/>
           </a:prstGeom>
           <a:ln>
             <a:solidFill>
@@ -4122,12 +3970,12 @@
         </p:nvCxnSpPr>
         <p:spPr>
           <a:xfrm flipH="1">
-            <a:off x="8619949" y="2037867"/>
-            <a:ext cx="634" cy="2894758"/>
+            <a:off x="8619949" y="2130200"/>
+            <a:ext cx="635" cy="2802425"/>
           </a:xfrm>
           <a:prstGeom prst="bentConnector3">
             <a:avLst>
-              <a:gd name="adj1" fmla="val -36056782"/>
+              <a:gd name="adj1" fmla="val -36000000"/>
             </a:avLst>
           </a:prstGeom>
           <a:ln>
@@ -4159,7 +4007,7 @@
         </p:nvGrpSpPr>
         <p:grpSpPr>
           <a:xfrm flipH="1">
-            <a:off x="8622672" y="1926963"/>
+            <a:off x="8626368" y="2025646"/>
             <a:ext cx="124322" cy="235296"/>
             <a:chOff x="3360772" y="2469497"/>
             <a:chExt cx="126411" cy="229510"/>
@@ -4280,9 +4128,9 @@
         <p:grpSpPr>
           <a:xfrm>
             <a:off x="4870520" y="1311121"/>
-            <a:ext cx="1200970" cy="1384995"/>
+            <a:ext cx="1200970" cy="1569660"/>
             <a:chOff x="4296228" y="798286"/>
-            <a:chExt cx="1200970" cy="1384995"/>
+            <a:chExt cx="1200970" cy="1569660"/>
           </a:xfrm>
         </p:grpSpPr>
         <p:sp>
@@ -4294,7 +4142,7 @@
           <p:spPr>
             <a:xfrm>
               <a:off x="4296229" y="798286"/>
-              <a:ext cx="1200968" cy="1384995"/>
+              <a:ext cx="1200968" cy="1569660"/>
             </a:xfrm>
             <a:prstGeom prst="rect">
               <a:avLst/>
@@ -4324,7 +4172,13 @@
             <a:p>
               <a:r>
                 <a:rPr lang="en-SG" sz="1200" dirty="0" smtClean="0"/>
-                <a:t>Date (PK) (FK)</a:t>
+                <a:t>ID (PK)</a:t>
+              </a:r>
+            </a:p>
+            <a:p>
+              <a:r>
+                <a:rPr lang="en-SG" sz="1200" dirty="0" smtClean="0"/>
+                <a:t>Date (FK)</a:t>
               </a:r>
             </a:p>
             <a:p>
@@ -4488,7 +4342,7 @@
         </p:nvGrpSpPr>
         <p:grpSpPr>
           <a:xfrm flipH="1">
-            <a:off x="6070840" y="1886002"/>
+            <a:off x="6070840" y="1970916"/>
             <a:ext cx="124322" cy="235296"/>
             <a:chOff x="3360772" y="2469497"/>
             <a:chExt cx="126411" cy="229510"/>
@@ -4574,9 +4428,9 @@
         <p:grpSpPr>
           <a:xfrm>
             <a:off x="4876197" y="2991154"/>
-            <a:ext cx="1200970" cy="1384995"/>
+            <a:ext cx="1200970" cy="1200329"/>
             <a:chOff x="4296229" y="798286"/>
-            <a:chExt cx="1200970" cy="1384995"/>
+            <a:chExt cx="1200970" cy="1200329"/>
           </a:xfrm>
         </p:grpSpPr>
         <p:sp>
@@ -4588,7 +4442,7 @@
           <p:spPr>
             <a:xfrm>
               <a:off x="4296229" y="798286"/>
-              <a:ext cx="1200968" cy="1384995"/>
+              <a:ext cx="1200968" cy="1200329"/>
             </a:xfrm>
             <a:prstGeom prst="rect">
               <a:avLst/>
@@ -4618,7 +4472,13 @@
             <a:p>
               <a:r>
                 <a:rPr lang="en-SG" sz="1200" dirty="0" smtClean="0"/>
-                <a:t>Date (PK) (FK)</a:t>
+                <a:t>ID (PK)</a:t>
+              </a:r>
+            </a:p>
+            <a:p>
+              <a:r>
+                <a:rPr lang="en-SG" sz="1200" dirty="0" smtClean="0"/>
+                <a:t>Date (FK)</a:t>
               </a:r>
             </a:p>
             <a:p>
@@ -4626,21 +4486,7 @@
                 <a:rPr lang="en-SG" sz="1200" dirty="0" err="1" smtClean="0"/>
                 <a:t>MeanPSI</a:t>
               </a:r>
-              <a:endParaRPr lang="en-SG" sz="1200" dirty="0"/>
-            </a:p>
-            <a:p>
-              <a:r>
-                <a:rPr lang="en-SG" sz="1200" dirty="0" err="1" smtClean="0"/>
-                <a:t>MaxPSI</a:t>
-              </a:r>
-              <a:endParaRPr lang="en-SG" sz="1200" dirty="0"/>
-            </a:p>
-            <a:p>
-              <a:r>
-                <a:rPr lang="en-SG" sz="1200" dirty="0" err="1" smtClean="0"/>
-                <a:t>MinPSI</a:t>
-              </a:r>
-              <a:endParaRPr lang="en-SG" sz="1200" dirty="0"/>
+              <a:endParaRPr lang="en-SG" sz="1200" dirty="0" smtClean="0"/>
             </a:p>
             <a:p>
               <a:r>
@@ -4783,7 +4629,7 @@
         </p:nvGrpSpPr>
         <p:grpSpPr>
           <a:xfrm flipH="1">
-            <a:off x="6070840" y="3568644"/>
+            <a:off x="6070840" y="3472723"/>
             <a:ext cx="124322" cy="235296"/>
             <a:chOff x="3360772" y="2469497"/>
             <a:chExt cx="126411" cy="229510"/>
@@ -4973,7 +4819,7 @@
         </p:nvGrpSpPr>
         <p:grpSpPr>
           <a:xfrm>
-            <a:off x="2431219" y="2737084"/>
+            <a:off x="2654325" y="2618511"/>
             <a:ext cx="126411" cy="229510"/>
             <a:chOff x="3360772" y="2469497"/>
             <a:chExt cx="126411" cy="229510"/>
@@ -5097,13 +4943,13 @@
         </p:nvCxnSpPr>
         <p:spPr>
           <a:xfrm flipH="1">
-            <a:off x="6069526" y="2003619"/>
-            <a:ext cx="1963" cy="2929006"/>
+            <a:off x="6069527" y="2095951"/>
+            <a:ext cx="1962" cy="2836674"/>
           </a:xfrm>
           <a:prstGeom prst="bentConnector4">
             <a:avLst>
-              <a:gd name="adj1" fmla="val -27002038"/>
-              <a:gd name="adj2" fmla="val 98186"/>
+              <a:gd name="adj1" fmla="val -26964628"/>
+              <a:gd name="adj2" fmla="val 97911"/>
             </a:avLst>
           </a:prstGeom>
           <a:ln>
@@ -5170,7 +5016,7 @@
         </p:nvCxnSpPr>
         <p:spPr>
           <a:xfrm>
-            <a:off x="6179703" y="4773232"/>
+            <a:off x="6164526" y="4769437"/>
             <a:ext cx="0" cy="182957"/>
           </a:xfrm>
           <a:prstGeom prst="line">
@@ -5279,14 +5125,561 @@
         </p:nvCxnSpPr>
         <p:spPr>
           <a:xfrm flipH="1">
-            <a:off x="6075057" y="3683652"/>
-            <a:ext cx="2108" cy="1004088"/>
+            <a:off x="6075057" y="3591319"/>
+            <a:ext cx="2108" cy="1096421"/>
           </a:xfrm>
           <a:prstGeom prst="bentConnector4">
             <a:avLst>
-              <a:gd name="adj1" fmla="val -15724383"/>
-              <a:gd name="adj2" fmla="val 99928"/>
+              <a:gd name="adj1" fmla="val -10844402"/>
+              <a:gd name="adj2" fmla="val 99609"/>
             </a:avLst>
+          </a:prstGeom>
+          <a:ln>
+            <a:solidFill>
+              <a:schemeClr val="tx1"/>
+            </a:solidFill>
+          </a:ln>
+        </p:spPr>
+        <p:style>
+          <a:lnRef idx="1">
+            <a:schemeClr val="accent1"/>
+          </a:lnRef>
+          <a:fillRef idx="0">
+            <a:schemeClr val="accent1"/>
+          </a:fillRef>
+          <a:effectRef idx="0">
+            <a:schemeClr val="accent1"/>
+          </a:effectRef>
+          <a:fontRef idx="minor">
+            <a:schemeClr val="tx1"/>
+          </a:fontRef>
+        </p:style>
+      </p:cxnSp>
+      <p:grpSp>
+        <p:nvGrpSpPr>
+          <p:cNvPr id="82" name="Group 81"/>
+          <p:cNvGrpSpPr/>
+          <p:nvPr/>
+        </p:nvGrpSpPr>
+        <p:grpSpPr>
+          <a:xfrm>
+            <a:off x="2735309" y="3783470"/>
+            <a:ext cx="1317655" cy="1384995"/>
+            <a:chOff x="4296229" y="798286"/>
+            <a:chExt cx="1200970" cy="1384995"/>
+          </a:xfrm>
+        </p:grpSpPr>
+        <p:sp>
+          <p:nvSpPr>
+            <p:cNvPr id="83" name="TextBox 82"/>
+            <p:cNvSpPr txBox="1"/>
+            <p:nvPr/>
+          </p:nvSpPr>
+          <p:spPr>
+            <a:xfrm>
+              <a:off x="4296229" y="798286"/>
+              <a:ext cx="1200968" cy="1384995"/>
+            </a:xfrm>
+            <a:prstGeom prst="rect">
+              <a:avLst/>
+            </a:prstGeom>
+            <a:noFill/>
+            <a:ln w="6350">
+              <a:solidFill>
+                <a:schemeClr val="tx1"/>
+              </a:solidFill>
+            </a:ln>
+          </p:spPr>
+          <p:txBody>
+            <a:bodyPr wrap="square" rtlCol="0">
+              <a:spAutoFit/>
+            </a:bodyPr>
+            <a:lstStyle/>
+            <a:p>
+              <a:r>
+                <a:rPr lang="en-SG" sz="1200" dirty="0" err="1"/>
+                <a:t>d</a:t>
+              </a:r>
+              <a:r>
+                <a:rPr lang="en-SG" sz="1200" dirty="0" err="1" smtClean="0"/>
+                <a:t>imHDBLocation</a:t>
+              </a:r>
+              <a:endParaRPr lang="en-SG" sz="1200" dirty="0" smtClean="0"/>
+            </a:p>
+            <a:p>
+              <a:endParaRPr lang="en-SG" sz="1200" dirty="0" smtClean="0"/>
+            </a:p>
+            <a:p>
+              <a:r>
+                <a:rPr lang="en-SG" sz="1200" dirty="0" smtClean="0"/>
+                <a:t>ID (PK)</a:t>
+              </a:r>
+            </a:p>
+            <a:p>
+              <a:r>
+                <a:rPr lang="en-SG" sz="1200" dirty="0" smtClean="0"/>
+                <a:t>Address</a:t>
+              </a:r>
+            </a:p>
+            <a:p>
+              <a:r>
+                <a:rPr lang="en-SG" sz="1200" dirty="0" smtClean="0"/>
+                <a:t>Latitude</a:t>
+              </a:r>
+            </a:p>
+            <a:p>
+              <a:r>
+                <a:rPr lang="en-SG" sz="1200" dirty="0" smtClean="0"/>
+                <a:t>Longitude</a:t>
+              </a:r>
+            </a:p>
+            <a:p>
+              <a:r>
+                <a:rPr lang="en-SG" sz="1200" dirty="0" err="1" smtClean="0"/>
+                <a:t>RegionId</a:t>
+              </a:r>
+              <a:r>
+                <a:rPr lang="en-SG" sz="1200" dirty="0" smtClean="0"/>
+                <a:t> (FK)</a:t>
+              </a:r>
+            </a:p>
+          </p:txBody>
+        </p:sp>
+        <p:cxnSp>
+          <p:nvCxnSpPr>
+            <p:cNvPr id="84" name="Straight Connector 83"/>
+            <p:cNvCxnSpPr/>
+            <p:nvPr/>
+          </p:nvCxnSpPr>
+          <p:spPr>
+            <a:xfrm flipH="1">
+              <a:off x="4296229" y="1126467"/>
+              <a:ext cx="1200970" cy="1"/>
+            </a:xfrm>
+            <a:prstGeom prst="line">
+              <a:avLst/>
+            </a:prstGeom>
+            <a:ln>
+              <a:solidFill>
+                <a:schemeClr val="tx1"/>
+              </a:solidFill>
+            </a:ln>
+          </p:spPr>
+          <p:style>
+            <a:lnRef idx="1">
+              <a:schemeClr val="accent1"/>
+            </a:lnRef>
+            <a:fillRef idx="0">
+              <a:schemeClr val="accent1"/>
+            </a:fillRef>
+            <a:effectRef idx="0">
+              <a:schemeClr val="accent1"/>
+            </a:effectRef>
+            <a:fontRef idx="minor">
+              <a:schemeClr val="tx1"/>
+            </a:fontRef>
+          </p:style>
+        </p:cxnSp>
+      </p:grpSp>
+      <p:grpSp>
+        <p:nvGrpSpPr>
+          <p:cNvPr id="85" name="Group 84"/>
+          <p:cNvGrpSpPr/>
+          <p:nvPr/>
+        </p:nvGrpSpPr>
+        <p:grpSpPr>
+          <a:xfrm>
+            <a:off x="2609372" y="4781385"/>
+            <a:ext cx="126411" cy="229510"/>
+            <a:chOff x="3360772" y="2469497"/>
+            <a:chExt cx="126411" cy="229510"/>
+          </a:xfrm>
+        </p:grpSpPr>
+        <p:cxnSp>
+          <p:nvCxnSpPr>
+            <p:cNvPr id="86" name="Straight Connector 85"/>
+            <p:cNvCxnSpPr/>
+            <p:nvPr/>
+          </p:nvCxnSpPr>
+          <p:spPr>
+            <a:xfrm flipV="1">
+              <a:off x="3360772" y="2469497"/>
+              <a:ext cx="126411" cy="102677"/>
+            </a:xfrm>
+            <a:prstGeom prst="line">
+              <a:avLst/>
+            </a:prstGeom>
+            <a:ln>
+              <a:solidFill>
+                <a:schemeClr val="tx1"/>
+              </a:solidFill>
+            </a:ln>
+          </p:spPr>
+          <p:style>
+            <a:lnRef idx="1">
+              <a:schemeClr val="accent1"/>
+            </a:lnRef>
+            <a:fillRef idx="0">
+              <a:schemeClr val="accent1"/>
+            </a:fillRef>
+            <a:effectRef idx="0">
+              <a:schemeClr val="accent1"/>
+            </a:effectRef>
+            <a:fontRef idx="minor">
+              <a:schemeClr val="tx1"/>
+            </a:fontRef>
+          </p:style>
+        </p:cxnSp>
+        <p:cxnSp>
+          <p:nvCxnSpPr>
+            <p:cNvPr id="90" name="Straight Connector 89"/>
+            <p:cNvCxnSpPr/>
+            <p:nvPr/>
+          </p:nvCxnSpPr>
+          <p:spPr>
+            <a:xfrm>
+              <a:off x="3360772" y="2572174"/>
+              <a:ext cx="126411" cy="126833"/>
+            </a:xfrm>
+            <a:prstGeom prst="line">
+              <a:avLst/>
+            </a:prstGeom>
+            <a:ln>
+              <a:solidFill>
+                <a:schemeClr val="tx1"/>
+              </a:solidFill>
+            </a:ln>
+          </p:spPr>
+          <p:style>
+            <a:lnRef idx="1">
+              <a:schemeClr val="accent1"/>
+            </a:lnRef>
+            <a:fillRef idx="0">
+              <a:schemeClr val="accent1"/>
+            </a:fillRef>
+            <a:effectRef idx="0">
+              <a:schemeClr val="accent1"/>
+            </a:effectRef>
+            <a:fontRef idx="minor">
+              <a:schemeClr val="tx1"/>
+            </a:fontRef>
+          </p:style>
+        </p:cxnSp>
+      </p:grpSp>
+      <p:cxnSp>
+        <p:nvCxnSpPr>
+          <p:cNvPr id="104" name="Straight Connector 103"/>
+          <p:cNvCxnSpPr/>
+          <p:nvPr/>
+        </p:nvCxnSpPr>
+        <p:spPr>
+          <a:xfrm flipH="1">
+            <a:off x="3975795" y="2942709"/>
+            <a:ext cx="230389" cy="1018"/>
+          </a:xfrm>
+          <a:prstGeom prst="line">
+            <a:avLst/>
+          </a:prstGeom>
+          <a:ln>
+            <a:solidFill>
+              <a:schemeClr val="tx1"/>
+            </a:solidFill>
+          </a:ln>
+        </p:spPr>
+        <p:style>
+          <a:lnRef idx="1">
+            <a:schemeClr val="accent1"/>
+          </a:lnRef>
+          <a:fillRef idx="0">
+            <a:schemeClr val="accent1"/>
+          </a:fillRef>
+          <a:effectRef idx="0">
+            <a:schemeClr val="accent1"/>
+          </a:effectRef>
+          <a:fontRef idx="minor">
+            <a:schemeClr val="tx1"/>
+          </a:fontRef>
+        </p:style>
+      </p:cxnSp>
+      <p:cxnSp>
+        <p:nvCxnSpPr>
+          <p:cNvPr id="105" name="Straight Connector 104"/>
+          <p:cNvCxnSpPr/>
+          <p:nvPr/>
+        </p:nvCxnSpPr>
+        <p:spPr>
+          <a:xfrm>
+            <a:off x="2717530" y="1174101"/>
+            <a:ext cx="0" cy="182957"/>
+          </a:xfrm>
+          <a:prstGeom prst="line">
+            <a:avLst/>
+          </a:prstGeom>
+          <a:ln>
+            <a:solidFill>
+              <a:schemeClr val="tx1"/>
+            </a:solidFill>
+          </a:ln>
+        </p:spPr>
+        <p:style>
+          <a:lnRef idx="1">
+            <a:schemeClr val="accent1"/>
+          </a:lnRef>
+          <a:fillRef idx="0">
+            <a:schemeClr val="accent1"/>
+          </a:fillRef>
+          <a:effectRef idx="0">
+            <a:schemeClr val="accent1"/>
+          </a:effectRef>
+          <a:fontRef idx="minor">
+            <a:schemeClr val="tx1"/>
+          </a:fontRef>
+        </p:style>
+      </p:cxnSp>
+      <p:cxnSp>
+        <p:nvCxnSpPr>
+          <p:cNvPr id="106" name="Elbow Connector 105"/>
+          <p:cNvCxnSpPr/>
+          <p:nvPr/>
+        </p:nvCxnSpPr>
+        <p:spPr>
+          <a:xfrm rot="16200000" flipH="1">
+            <a:off x="3538490" y="3595550"/>
+            <a:ext cx="2010553" cy="663596"/>
+          </a:xfrm>
+          <a:prstGeom prst="bentConnector3">
+            <a:avLst>
+              <a:gd name="adj1" fmla="val 99811"/>
+            </a:avLst>
+          </a:prstGeom>
+          <a:ln>
+            <a:solidFill>
+              <a:schemeClr val="tx1"/>
+            </a:solidFill>
+          </a:ln>
+        </p:spPr>
+        <p:style>
+          <a:lnRef idx="1">
+            <a:schemeClr val="accent1"/>
+          </a:lnRef>
+          <a:fillRef idx="0">
+            <a:schemeClr val="accent1"/>
+          </a:fillRef>
+          <a:effectRef idx="0">
+            <a:schemeClr val="accent1"/>
+          </a:effectRef>
+          <a:fontRef idx="minor">
+            <a:schemeClr val="tx1"/>
+          </a:fontRef>
+        </p:style>
+      </p:cxnSp>
+      <p:grpSp>
+        <p:nvGrpSpPr>
+          <p:cNvPr id="115" name="Group 114"/>
+          <p:cNvGrpSpPr/>
+          <p:nvPr/>
+        </p:nvGrpSpPr>
+        <p:grpSpPr>
+          <a:xfrm flipH="1">
+            <a:off x="3984374" y="2825061"/>
+            <a:ext cx="124322" cy="235296"/>
+            <a:chOff x="3360772" y="2469497"/>
+            <a:chExt cx="126411" cy="229510"/>
+          </a:xfrm>
+        </p:grpSpPr>
+        <p:cxnSp>
+          <p:nvCxnSpPr>
+            <p:cNvPr id="116" name="Straight Connector 115"/>
+            <p:cNvCxnSpPr/>
+            <p:nvPr/>
+          </p:nvCxnSpPr>
+          <p:spPr>
+            <a:xfrm flipV="1">
+              <a:off x="3360772" y="2469497"/>
+              <a:ext cx="126411" cy="102677"/>
+            </a:xfrm>
+            <a:prstGeom prst="line">
+              <a:avLst/>
+            </a:prstGeom>
+            <a:ln>
+              <a:solidFill>
+                <a:schemeClr val="tx1"/>
+              </a:solidFill>
+            </a:ln>
+          </p:spPr>
+          <p:style>
+            <a:lnRef idx="1">
+              <a:schemeClr val="accent1"/>
+            </a:lnRef>
+            <a:fillRef idx="0">
+              <a:schemeClr val="accent1"/>
+            </a:fillRef>
+            <a:effectRef idx="0">
+              <a:schemeClr val="accent1"/>
+            </a:effectRef>
+            <a:fontRef idx="minor">
+              <a:schemeClr val="tx1"/>
+            </a:fontRef>
+          </p:style>
+        </p:cxnSp>
+        <p:cxnSp>
+          <p:nvCxnSpPr>
+            <p:cNvPr id="117" name="Straight Connector 116"/>
+            <p:cNvCxnSpPr/>
+            <p:nvPr/>
+          </p:nvCxnSpPr>
+          <p:spPr>
+            <a:xfrm>
+              <a:off x="3360772" y="2572174"/>
+              <a:ext cx="126411" cy="126833"/>
+            </a:xfrm>
+            <a:prstGeom prst="line">
+              <a:avLst/>
+            </a:prstGeom>
+            <a:ln>
+              <a:solidFill>
+                <a:schemeClr val="tx1"/>
+              </a:solidFill>
+            </a:ln>
+          </p:spPr>
+          <p:style>
+            <a:lnRef idx="1">
+              <a:schemeClr val="accent1"/>
+            </a:lnRef>
+            <a:fillRef idx="0">
+              <a:schemeClr val="accent1"/>
+            </a:fillRef>
+            <a:effectRef idx="0">
+              <a:schemeClr val="accent1"/>
+            </a:effectRef>
+            <a:fontRef idx="minor">
+              <a:schemeClr val="tx1"/>
+            </a:fontRef>
+          </p:style>
+        </p:cxnSp>
+      </p:grpSp>
+      <p:cxnSp>
+        <p:nvCxnSpPr>
+          <p:cNvPr id="118" name="Straight Connector 117"/>
+          <p:cNvCxnSpPr/>
+          <p:nvPr/>
+        </p:nvCxnSpPr>
+        <p:spPr>
+          <a:xfrm flipH="1">
+            <a:off x="2272814" y="1265580"/>
+            <a:ext cx="509524" cy="0"/>
+          </a:xfrm>
+          <a:prstGeom prst="line">
+            <a:avLst/>
+          </a:prstGeom>
+          <a:ln>
+            <a:solidFill>
+              <a:schemeClr val="tx1"/>
+            </a:solidFill>
+          </a:ln>
+        </p:spPr>
+        <p:style>
+          <a:lnRef idx="1">
+            <a:schemeClr val="accent1"/>
+          </a:lnRef>
+          <a:fillRef idx="0">
+            <a:schemeClr val="accent1"/>
+          </a:fillRef>
+          <a:effectRef idx="0">
+            <a:schemeClr val="accent1"/>
+          </a:effectRef>
+          <a:fontRef idx="minor">
+            <a:schemeClr val="tx1"/>
+          </a:fontRef>
+        </p:style>
+      </p:cxnSp>
+      <p:cxnSp>
+        <p:nvCxnSpPr>
+          <p:cNvPr id="119" name="Elbow Connector 118"/>
+          <p:cNvCxnSpPr/>
+          <p:nvPr/>
+        </p:nvCxnSpPr>
+        <p:spPr>
+          <a:xfrm>
+            <a:off x="2738877" y="4883221"/>
+            <a:ext cx="2136684" cy="503393"/>
+          </a:xfrm>
+          <a:prstGeom prst="bentConnector3">
+            <a:avLst>
+              <a:gd name="adj1" fmla="val -21682"/>
+            </a:avLst>
+          </a:prstGeom>
+          <a:ln>
+            <a:solidFill>
+              <a:schemeClr val="tx1"/>
+            </a:solidFill>
+          </a:ln>
+        </p:spPr>
+        <p:style>
+          <a:lnRef idx="1">
+            <a:schemeClr val="accent1"/>
+          </a:lnRef>
+          <a:fillRef idx="0">
+            <a:schemeClr val="accent1"/>
+          </a:fillRef>
+          <a:effectRef idx="0">
+            <a:schemeClr val="accent1"/>
+          </a:effectRef>
+          <a:fontRef idx="minor">
+            <a:schemeClr val="tx1"/>
+          </a:fontRef>
+        </p:style>
+      </p:cxnSp>
+      <p:cxnSp>
+        <p:nvCxnSpPr>
+          <p:cNvPr id="123" name="Straight Connector 122"/>
+          <p:cNvCxnSpPr/>
+          <p:nvPr/>
+        </p:nvCxnSpPr>
+        <p:spPr>
+          <a:xfrm>
+            <a:off x="4803894" y="5295136"/>
+            <a:ext cx="0" cy="182957"/>
+          </a:xfrm>
+          <a:prstGeom prst="line">
+            <a:avLst/>
+          </a:prstGeom>
+          <a:ln>
+            <a:solidFill>
+              <a:schemeClr val="tx1"/>
+            </a:solidFill>
+          </a:ln>
+        </p:spPr>
+        <p:style>
+          <a:lnRef idx="1">
+            <a:schemeClr val="accent1"/>
+          </a:lnRef>
+          <a:fillRef idx="0">
+            <a:schemeClr val="accent1"/>
+          </a:fillRef>
+          <a:effectRef idx="0">
+            <a:schemeClr val="accent1"/>
+          </a:effectRef>
+          <a:fontRef idx="minor">
+            <a:schemeClr val="tx1"/>
+          </a:fontRef>
+        </p:style>
+      </p:cxnSp>
+      <p:cxnSp>
+        <p:nvCxnSpPr>
+          <p:cNvPr id="3" name="Straight Connector 2"/>
+          <p:cNvCxnSpPr>
+            <a:stCxn id="18" idx="3"/>
+          </p:cNvCxnSpPr>
+          <p:nvPr/>
+        </p:nvCxnSpPr>
+        <p:spPr>
+          <a:xfrm flipV="1">
+            <a:off x="6071489" y="5065776"/>
+            <a:ext cx="1040665" cy="3"/>
+          </a:xfrm>
+          <a:prstGeom prst="line">
+            <a:avLst/>
           </a:prstGeom>
           <a:ln>
             <a:solidFill>

</xml_diff>